<commit_message>
Title and abstract in README
</commit_message>
<xml_diff>
--- a/Exam 2023-06-27 analysis/Analisi Exam 2023-06-27.pptx
+++ b/Exam 2023-06-27 analysis/Analisi Exam 2023-06-27.pptx
@@ -214,7 +214,7 @@
           <a:p>
             <a:fld id="{981BA649-F833-E942-B36E-F3D5DDAEDB86}" type="datetimeFigureOut">
               <a:rPr lang="it-IT" smtClean="0"/>
-              <a:t>19/08/23</a:t>
+              <a:t>24/10/23</a:t>
             </a:fld>
             <a:endParaRPr lang="it-IT"/>
           </a:p>
@@ -796,7 +796,7 @@
           <a:p>
             <a:fld id="{03403DB8-786C-9C41-BDCA-66370D8B3A96}" type="datetimeFigureOut">
               <a:rPr lang="it-IT" smtClean="0"/>
-              <a:t>19/08/23</a:t>
+              <a:t>24/10/23</a:t>
             </a:fld>
             <a:endParaRPr lang="it-IT"/>
           </a:p>
@@ -994,7 +994,7 @@
           <a:p>
             <a:fld id="{03403DB8-786C-9C41-BDCA-66370D8B3A96}" type="datetimeFigureOut">
               <a:rPr lang="it-IT" smtClean="0"/>
-              <a:t>19/08/23</a:t>
+              <a:t>24/10/23</a:t>
             </a:fld>
             <a:endParaRPr lang="it-IT"/>
           </a:p>
@@ -1202,7 +1202,7 @@
           <a:p>
             <a:fld id="{03403DB8-786C-9C41-BDCA-66370D8B3A96}" type="datetimeFigureOut">
               <a:rPr lang="it-IT" smtClean="0"/>
-              <a:t>19/08/23</a:t>
+              <a:t>24/10/23</a:t>
             </a:fld>
             <a:endParaRPr lang="it-IT"/>
           </a:p>
@@ -1410,7 +1410,7 @@
           <a:p>
             <a:fld id="{03403DB8-786C-9C41-BDCA-66370D8B3A96}" type="datetimeFigureOut">
               <a:rPr lang="it-IT" smtClean="0"/>
-              <a:t>19/08/23</a:t>
+              <a:t>24/10/23</a:t>
             </a:fld>
             <a:endParaRPr lang="it-IT"/>
           </a:p>
@@ -1685,7 +1685,7 @@
           <a:p>
             <a:fld id="{03403DB8-786C-9C41-BDCA-66370D8B3A96}" type="datetimeFigureOut">
               <a:rPr lang="it-IT" smtClean="0"/>
-              <a:t>19/08/23</a:t>
+              <a:t>24/10/23</a:t>
             </a:fld>
             <a:endParaRPr lang="it-IT"/>
           </a:p>
@@ -1950,7 +1950,7 @@
           <a:p>
             <a:fld id="{03403DB8-786C-9C41-BDCA-66370D8B3A96}" type="datetimeFigureOut">
               <a:rPr lang="it-IT" smtClean="0"/>
-              <a:t>19/08/23</a:t>
+              <a:t>24/10/23</a:t>
             </a:fld>
             <a:endParaRPr lang="it-IT"/>
           </a:p>
@@ -2362,7 +2362,7 @@
           <a:p>
             <a:fld id="{03403DB8-786C-9C41-BDCA-66370D8B3A96}" type="datetimeFigureOut">
               <a:rPr lang="it-IT" smtClean="0"/>
-              <a:t>19/08/23</a:t>
+              <a:t>24/10/23</a:t>
             </a:fld>
             <a:endParaRPr lang="it-IT"/>
           </a:p>
@@ -2503,7 +2503,7 @@
           <a:p>
             <a:fld id="{03403DB8-786C-9C41-BDCA-66370D8B3A96}" type="datetimeFigureOut">
               <a:rPr lang="it-IT" smtClean="0"/>
-              <a:t>19/08/23</a:t>
+              <a:t>24/10/23</a:t>
             </a:fld>
             <a:endParaRPr lang="it-IT"/>
           </a:p>
@@ -2616,7 +2616,7 @@
           <a:p>
             <a:fld id="{03403DB8-786C-9C41-BDCA-66370D8B3A96}" type="datetimeFigureOut">
               <a:rPr lang="it-IT" smtClean="0"/>
-              <a:t>19/08/23</a:t>
+              <a:t>24/10/23</a:t>
             </a:fld>
             <a:endParaRPr lang="it-IT"/>
           </a:p>
@@ -2927,7 +2927,7 @@
           <a:p>
             <a:fld id="{03403DB8-786C-9C41-BDCA-66370D8B3A96}" type="datetimeFigureOut">
               <a:rPr lang="it-IT" smtClean="0"/>
-              <a:t>19/08/23</a:t>
+              <a:t>24/10/23</a:t>
             </a:fld>
             <a:endParaRPr lang="it-IT"/>
           </a:p>
@@ -3215,7 +3215,7 @@
           <a:p>
             <a:fld id="{03403DB8-786C-9C41-BDCA-66370D8B3A96}" type="datetimeFigureOut">
               <a:rPr lang="it-IT" smtClean="0"/>
-              <a:t>19/08/23</a:t>
+              <a:t>24/10/23</a:t>
             </a:fld>
             <a:endParaRPr lang="it-IT"/>
           </a:p>
@@ -3456,7 +3456,7 @@
           <a:p>
             <a:fld id="{03403DB8-786C-9C41-BDCA-66370D8B3A96}" type="datetimeFigureOut">
               <a:rPr lang="it-IT" smtClean="0"/>
-              <a:t>19/08/23</a:t>
+              <a:t>24/10/23</a:t>
             </a:fld>
             <a:endParaRPr lang="it-IT"/>
           </a:p>
@@ -6346,7 +6346,7 @@
           <a:p>
             <a:r>
               <a:rPr lang="en-GB" dirty="0"/>
-              <a:t>Strings and Boxes types should be compared using equals()</a:t>
+              <a:t>Strings and Boxed types should be compared using equals()</a:t>
             </a:r>
           </a:p>
           <a:p>

</xml_diff>